<commit_message>
Added learning outcomes item
</commit_message>
<xml_diff>
--- a/Courseware/Bonsai On A Budget (running).pptx
+++ b/Courseware/Bonsai On A Budget (running).pptx
@@ -910,7 +910,7 @@
             <a:fld id="{B61BEF0D-F0BB-DE4B-95CE-6DB70DBA9567}" type="datetimeFigureOut">
               <a:rPr lang="en-US" smtClean="0"/>
               <a:pPr/>
-              <a:t>6/12/2024</a:t>
+              <a:t>7/3/2024</a:t>
             </a:fld>
             <a:endParaRPr lang="en-US" dirty="0"/>
           </a:p>
@@ -1163,7 +1163,7 @@
             <a:fld id="{B61BEF0D-F0BB-DE4B-95CE-6DB70DBA9567}" type="datetimeFigureOut">
               <a:rPr lang="en-US" smtClean="0"/>
               <a:pPr/>
-              <a:t>6/12/2024</a:t>
+              <a:t>7/3/2024</a:t>
             </a:fld>
             <a:endParaRPr lang="en-US" dirty="0"/>
           </a:p>
@@ -1479,7 +1479,7 @@
             <a:fld id="{B61BEF0D-F0BB-DE4B-95CE-6DB70DBA9567}" type="datetimeFigureOut">
               <a:rPr lang="en-US" smtClean="0"/>
               <a:pPr/>
-              <a:t>6/12/2024</a:t>
+              <a:t>7/3/2024</a:t>
             </a:fld>
             <a:endParaRPr lang="en-US" dirty="0"/>
           </a:p>
@@ -1822,7 +1822,7 @@
             <a:fld id="{B61BEF0D-F0BB-DE4B-95CE-6DB70DBA9567}" type="datetimeFigureOut">
               <a:rPr lang="en-US" smtClean="0"/>
               <a:pPr/>
-              <a:t>6/12/2024</a:t>
+              <a:t>7/3/2024</a:t>
             </a:fld>
             <a:endParaRPr lang="en-US" dirty="0"/>
           </a:p>
@@ -2138,7 +2138,7 @@
             <a:fld id="{B61BEF0D-F0BB-DE4B-95CE-6DB70DBA9567}" type="datetimeFigureOut">
               <a:rPr lang="en-US" smtClean="0"/>
               <a:pPr/>
-              <a:t>6/12/2024</a:t>
+              <a:t>7/3/2024</a:t>
             </a:fld>
             <a:endParaRPr lang="en-US" dirty="0"/>
           </a:p>
@@ -2533,7 +2533,7 @@
             <a:fld id="{B61BEF0D-F0BB-DE4B-95CE-6DB70DBA9567}" type="datetimeFigureOut">
               <a:rPr lang="en-US" smtClean="0"/>
               <a:pPr/>
-              <a:t>6/12/2024</a:t>
+              <a:t>7/3/2024</a:t>
             </a:fld>
             <a:endParaRPr lang="en-US" dirty="0"/>
           </a:p>
@@ -2704,7 +2704,7 @@
           <a:p>
             <a:fld id="{55C6B4A9-1611-4792-9094-5F34BCA07E0B}" type="datetimeFigureOut">
               <a:rPr lang="en-US" smtClean="0"/>
-              <a:t>6/12/2024</a:t>
+              <a:t>7/3/2024</a:t>
             </a:fld>
             <a:endParaRPr lang="en-US" dirty="0"/>
           </a:p>
@@ -2885,7 +2885,7 @@
             <a:fld id="{B61BEF0D-F0BB-DE4B-95CE-6DB70DBA9567}" type="datetimeFigureOut">
               <a:rPr lang="en-US" smtClean="0"/>
               <a:pPr/>
-              <a:t>6/12/2024</a:t>
+              <a:t>7/3/2024</a:t>
             </a:fld>
             <a:endParaRPr lang="en-US" dirty="0"/>
           </a:p>
@@ -3063,7 +3063,7 @@
             <a:fld id="{B61BEF0D-F0BB-DE4B-95CE-6DB70DBA9567}" type="datetimeFigureOut">
               <a:rPr lang="en-US" smtClean="0"/>
               <a:pPr/>
-              <a:t>6/12/2024</a:t>
+              <a:t>7/3/2024</a:t>
             </a:fld>
             <a:endParaRPr lang="en-US" dirty="0"/>
           </a:p>
@@ -3312,7 +3312,7 @@
             <a:fld id="{B61BEF0D-F0BB-DE4B-95CE-6DB70DBA9567}" type="datetimeFigureOut">
               <a:rPr lang="en-US" smtClean="0"/>
               <a:pPr/>
-              <a:t>6/12/2024</a:t>
+              <a:t>7/3/2024</a:t>
             </a:fld>
             <a:endParaRPr lang="en-US" dirty="0"/>
           </a:p>
@@ -3545,7 +3545,7 @@
           <a:p>
             <a:fld id="{EB712588-04B1-427B-82EE-E8DB90309F08}" type="datetimeFigureOut">
               <a:rPr lang="en-US" smtClean="0"/>
-              <a:t>6/12/2024</a:t>
+              <a:t>7/3/2024</a:t>
             </a:fld>
             <a:endParaRPr lang="en-US" dirty="0"/>
           </a:p>
@@ -3920,7 +3920,7 @@
             <a:fld id="{B61BEF0D-F0BB-DE4B-95CE-6DB70DBA9567}" type="datetimeFigureOut">
               <a:rPr lang="en-US" smtClean="0"/>
               <a:pPr/>
-              <a:t>6/12/2024</a:t>
+              <a:t>7/3/2024</a:t>
             </a:fld>
             <a:endParaRPr lang="en-US" dirty="0"/>
           </a:p>
@@ -4045,7 +4045,7 @@
             <a:fld id="{B61BEF0D-F0BB-DE4B-95CE-6DB70DBA9567}" type="datetimeFigureOut">
               <a:rPr lang="en-US" smtClean="0"/>
               <a:pPr/>
-              <a:t>6/12/2024</a:t>
+              <a:t>7/3/2024</a:t>
             </a:fld>
             <a:endParaRPr lang="en-US" dirty="0"/>
           </a:p>
@@ -4142,7 +4142,7 @@
             <a:fld id="{B61BEF0D-F0BB-DE4B-95CE-6DB70DBA9567}" type="datetimeFigureOut">
               <a:rPr lang="en-US" smtClean="0"/>
               <a:pPr/>
-              <a:t>6/12/2024</a:t>
+              <a:t>7/3/2024</a:t>
             </a:fld>
             <a:endParaRPr lang="en-US" dirty="0"/>
           </a:p>
@@ -4398,7 +4398,7 @@
           <a:p>
             <a:fld id="{42A54C80-263E-416B-A8E0-580EDEADCBDC}" type="datetimeFigureOut">
               <a:rPr lang="en-US" smtClean="0"/>
-              <a:t>6/12/2024</a:t>
+              <a:t>7/3/2024</a:t>
             </a:fld>
             <a:endParaRPr lang="en-US" dirty="0"/>
           </a:p>
@@ -4662,7 +4662,7 @@
             <a:fld id="{B61BEF0D-F0BB-DE4B-95CE-6DB70DBA9567}" type="datetimeFigureOut">
               <a:rPr lang="en-US" smtClean="0"/>
               <a:pPr/>
-              <a:t>6/12/2024</a:t>
+              <a:t>7/3/2024</a:t>
             </a:fld>
             <a:endParaRPr lang="en-US" dirty="0"/>
           </a:p>
@@ -5407,7 +5407,7 @@
             <a:fld id="{B61BEF0D-F0BB-DE4B-95CE-6DB70DBA9567}" type="datetimeFigureOut">
               <a:rPr lang="en-US" smtClean="0"/>
               <a:pPr/>
-              <a:t>6/12/2024</a:t>
+              <a:t>7/3/2024</a:t>
             </a:fld>
             <a:endParaRPr lang="en-US" dirty="0"/>
           </a:p>
@@ -24035,8 +24035,18 @@
           <a:lstStyle/>
           <a:p>
             <a:r>
+              <a:rPr lang="en-US"/>
+              <a:t>Be aware of the history and culture of bonsai</a:t>
+            </a:r>
+          </a:p>
+          <a:p>
+            <a:r>
+              <a:rPr lang="en-US"/>
+              <a:t>Understand </a:t>
+            </a:r>
+            <a:r>
               <a:rPr lang="en-US" dirty="0"/>
-              <a:t>Understand (at a high level) how a bonsai is produced</a:t>
+              <a:t>(at a high level) how a bonsai is produced</a:t>
             </a:r>
           </a:p>
           <a:p>

</xml_diff>

<commit_message>
Added "Art principles" slide (replaces wabi-sabi stub)
</commit_message>
<xml_diff>
--- a/Courseware/Bonsai On A Budget (running).pptx
+++ b/Courseware/Bonsai On A Budget (running).pptx
@@ -17,9 +17,9 @@
     <p:sldId id="263" r:id="rId11"/>
     <p:sldId id="277" r:id="rId12"/>
     <p:sldId id="267" r:id="rId13"/>
-    <p:sldId id="271" r:id="rId14"/>
-    <p:sldId id="272" r:id="rId15"/>
-    <p:sldId id="281" r:id="rId16"/>
+    <p:sldId id="281" r:id="rId14"/>
+    <p:sldId id="271" r:id="rId15"/>
+    <p:sldId id="272" r:id="rId16"/>
     <p:sldId id="259" r:id="rId17"/>
     <p:sldId id="264" r:id="rId18"/>
     <p:sldId id="279" r:id="rId19"/>
@@ -898,7 +898,7 @@
             <a:fld id="{B61BEF0D-F0BB-DE4B-95CE-6DB70DBA9567}" type="datetimeFigureOut">
               <a:rPr lang="en-US" smtClean="0"/>
               <a:pPr/>
-              <a:t>10/27/2024</a:t>
+              <a:t>12/24/2024</a:t>
             </a:fld>
             <a:endParaRPr lang="en-US" dirty="0"/>
           </a:p>
@@ -1151,7 +1151,7 @@
             <a:fld id="{B61BEF0D-F0BB-DE4B-95CE-6DB70DBA9567}" type="datetimeFigureOut">
               <a:rPr lang="en-US" smtClean="0"/>
               <a:pPr/>
-              <a:t>10/27/2024</a:t>
+              <a:t>12/24/2024</a:t>
             </a:fld>
             <a:endParaRPr lang="en-US" dirty="0"/>
           </a:p>
@@ -1467,7 +1467,7 @@
             <a:fld id="{B61BEF0D-F0BB-DE4B-95CE-6DB70DBA9567}" type="datetimeFigureOut">
               <a:rPr lang="en-US" smtClean="0"/>
               <a:pPr/>
-              <a:t>10/27/2024</a:t>
+              <a:t>12/24/2024</a:t>
             </a:fld>
             <a:endParaRPr lang="en-US" dirty="0"/>
           </a:p>
@@ -1810,7 +1810,7 @@
             <a:fld id="{B61BEF0D-F0BB-DE4B-95CE-6DB70DBA9567}" type="datetimeFigureOut">
               <a:rPr lang="en-US" smtClean="0"/>
               <a:pPr/>
-              <a:t>10/27/2024</a:t>
+              <a:t>12/24/2024</a:t>
             </a:fld>
             <a:endParaRPr lang="en-US" dirty="0"/>
           </a:p>
@@ -2126,7 +2126,7 @@
             <a:fld id="{B61BEF0D-F0BB-DE4B-95CE-6DB70DBA9567}" type="datetimeFigureOut">
               <a:rPr lang="en-US" smtClean="0"/>
               <a:pPr/>
-              <a:t>10/27/2024</a:t>
+              <a:t>12/24/2024</a:t>
             </a:fld>
             <a:endParaRPr lang="en-US" dirty="0"/>
           </a:p>
@@ -2521,7 +2521,7 @@
             <a:fld id="{B61BEF0D-F0BB-DE4B-95CE-6DB70DBA9567}" type="datetimeFigureOut">
               <a:rPr lang="en-US" smtClean="0"/>
               <a:pPr/>
-              <a:t>10/27/2024</a:t>
+              <a:t>12/24/2024</a:t>
             </a:fld>
             <a:endParaRPr lang="en-US" dirty="0"/>
           </a:p>
@@ -2692,7 +2692,7 @@
           <a:p>
             <a:fld id="{55C6B4A9-1611-4792-9094-5F34BCA07E0B}" type="datetimeFigureOut">
               <a:rPr lang="en-US" smtClean="0"/>
-              <a:t>10/27/2024</a:t>
+              <a:t>12/24/2024</a:t>
             </a:fld>
             <a:endParaRPr lang="en-US" dirty="0"/>
           </a:p>
@@ -2873,7 +2873,7 @@
             <a:fld id="{B61BEF0D-F0BB-DE4B-95CE-6DB70DBA9567}" type="datetimeFigureOut">
               <a:rPr lang="en-US" smtClean="0"/>
               <a:pPr/>
-              <a:t>10/27/2024</a:t>
+              <a:t>12/24/2024</a:t>
             </a:fld>
             <a:endParaRPr lang="en-US" dirty="0"/>
           </a:p>
@@ -3051,7 +3051,7 @@
             <a:fld id="{B61BEF0D-F0BB-DE4B-95CE-6DB70DBA9567}" type="datetimeFigureOut">
               <a:rPr lang="en-US" smtClean="0"/>
               <a:pPr/>
-              <a:t>10/27/2024</a:t>
+              <a:t>12/24/2024</a:t>
             </a:fld>
             <a:endParaRPr lang="en-US" dirty="0"/>
           </a:p>
@@ -3300,7 +3300,7 @@
             <a:fld id="{B61BEF0D-F0BB-DE4B-95CE-6DB70DBA9567}" type="datetimeFigureOut">
               <a:rPr lang="en-US" smtClean="0"/>
               <a:pPr/>
-              <a:t>10/27/2024</a:t>
+              <a:t>12/24/2024</a:t>
             </a:fld>
             <a:endParaRPr lang="en-US" dirty="0"/>
           </a:p>
@@ -3533,7 +3533,7 @@
           <a:p>
             <a:fld id="{EB712588-04B1-427B-82EE-E8DB90309F08}" type="datetimeFigureOut">
               <a:rPr lang="en-US" smtClean="0"/>
-              <a:t>10/27/2024</a:t>
+              <a:t>12/24/2024</a:t>
             </a:fld>
             <a:endParaRPr lang="en-US" dirty="0"/>
           </a:p>
@@ -3908,7 +3908,7 @@
             <a:fld id="{B61BEF0D-F0BB-DE4B-95CE-6DB70DBA9567}" type="datetimeFigureOut">
               <a:rPr lang="en-US" smtClean="0"/>
               <a:pPr/>
-              <a:t>10/27/2024</a:t>
+              <a:t>12/24/2024</a:t>
             </a:fld>
             <a:endParaRPr lang="en-US" dirty="0"/>
           </a:p>
@@ -4033,7 +4033,7 @@
             <a:fld id="{B61BEF0D-F0BB-DE4B-95CE-6DB70DBA9567}" type="datetimeFigureOut">
               <a:rPr lang="en-US" smtClean="0"/>
               <a:pPr/>
-              <a:t>10/27/2024</a:t>
+              <a:t>12/24/2024</a:t>
             </a:fld>
             <a:endParaRPr lang="en-US" dirty="0"/>
           </a:p>
@@ -4130,7 +4130,7 @@
             <a:fld id="{B61BEF0D-F0BB-DE4B-95CE-6DB70DBA9567}" type="datetimeFigureOut">
               <a:rPr lang="en-US" smtClean="0"/>
               <a:pPr/>
-              <a:t>10/27/2024</a:t>
+              <a:t>12/24/2024</a:t>
             </a:fld>
             <a:endParaRPr lang="en-US" dirty="0"/>
           </a:p>
@@ -4386,7 +4386,7 @@
           <a:p>
             <a:fld id="{42A54C80-263E-416B-A8E0-580EDEADCBDC}" type="datetimeFigureOut">
               <a:rPr lang="en-US" smtClean="0"/>
-              <a:t>10/27/2024</a:t>
+              <a:t>12/24/2024</a:t>
             </a:fld>
             <a:endParaRPr lang="en-US" dirty="0"/>
           </a:p>
@@ -4650,7 +4650,7 @@
             <a:fld id="{B61BEF0D-F0BB-DE4B-95CE-6DB70DBA9567}" type="datetimeFigureOut">
               <a:rPr lang="en-US" smtClean="0"/>
               <a:pPr/>
-              <a:t>10/27/2024</a:t>
+              <a:t>12/24/2024</a:t>
             </a:fld>
             <a:endParaRPr lang="en-US" dirty="0"/>
           </a:p>
@@ -5395,7 +5395,7 @@
             <a:fld id="{B61BEF0D-F0BB-DE4B-95CE-6DB70DBA9567}" type="datetimeFigureOut">
               <a:rPr lang="en-US" smtClean="0"/>
               <a:pPr/>
-              <a:t>10/27/2024</a:t>
+              <a:t>12/24/2024</a:t>
             </a:fld>
             <a:endParaRPr lang="en-US" dirty="0"/>
           </a:p>
@@ -9916,6 +9916,573 @@
           <a:p>
             <a:r>
               <a:rPr lang="en-US" dirty="0"/>
+              <a:t>Art à la Japan</a:t>
+            </a:r>
+            <a:br>
+              <a:rPr lang="en-US" dirty="0"/>
+            </a:br>
+            <a:r>
+              <a:rPr lang="en-US" sz="2800" dirty="0"/>
+              <a:t>Catching the eye</a:t>
+            </a:r>
+            <a:endParaRPr lang="en-GB" sz="2800" dirty="0"/>
+          </a:p>
+        </p:txBody>
+      </p:sp>
+      <p:sp>
+        <p:nvSpPr>
+          <p:cNvPr id="3" name="Content Placeholder 2">
+            <a:extLst>
+              <a:ext uri="{FF2B5EF4-FFF2-40B4-BE49-F238E27FC236}">
+                <a16:creationId xmlns:a16="http://schemas.microsoft.com/office/drawing/2014/main" id="{F7340934-5684-DA8A-A2B6-BA82211E4513}"/>
+              </a:ext>
+            </a:extLst>
+          </p:cNvPr>
+          <p:cNvSpPr>
+            <a:spLocks noGrp="1"/>
+          </p:cNvSpPr>
+          <p:nvPr>
+            <p:ph idx="1"/>
+          </p:nvPr>
+        </p:nvSpPr>
+        <p:spPr>
+          <a:xfrm>
+            <a:off x="5607423" y="1896034"/>
+            <a:ext cx="5634317" cy="4961965"/>
+          </a:xfrm>
+        </p:spPr>
+        <p:txBody>
+          <a:bodyPr>
+            <a:normAutofit/>
+          </a:bodyPr>
+          <a:lstStyle/>
+          <a:p>
+            <a:pPr marL="0" indent="0">
+              <a:buNone/>
+            </a:pPr>
+            <a:r>
+              <a:rPr lang="en-US" dirty="0"/>
+              <a:t>General aesthetic principles:</a:t>
+            </a:r>
+          </a:p>
+          <a:p>
+            <a:r>
+              <a:rPr lang="en-US" dirty="0"/>
+              <a:t>Harmony: similarity vs variety</a:t>
+            </a:r>
+          </a:p>
+          <a:p>
+            <a:r>
+              <a:rPr lang="en-US" dirty="0"/>
+              <a:t>Perspective</a:t>
+            </a:r>
+          </a:p>
+          <a:p>
+            <a:r>
+              <a:rPr lang="en-US" dirty="0"/>
+              <a:t>Repetition &amp; continuation</a:t>
+            </a:r>
+          </a:p>
+          <a:p>
+            <a:r>
+              <a:rPr lang="en-US" dirty="0"/>
+              <a:t>Balance: symmetry vs asymmetry</a:t>
+            </a:r>
+          </a:p>
+          <a:p>
+            <a:r>
+              <a:rPr lang="en-US" dirty="0"/>
+              <a:t>Rhythm</a:t>
+            </a:r>
+          </a:p>
+          <a:p>
+            <a:pPr marL="0" indent="0">
+              <a:buNone/>
+            </a:pPr>
+            <a:endParaRPr lang="en-US" dirty="0"/>
+          </a:p>
+          <a:p>
+            <a:pPr marL="0" indent="0">
+              <a:buNone/>
+            </a:pPr>
+            <a:r>
+              <a:rPr lang="en-US" dirty="0"/>
+              <a:t>Japan-specific additions:</a:t>
+            </a:r>
+          </a:p>
+          <a:p>
+            <a:r>
+              <a:rPr lang="en-US" dirty="0"/>
+              <a:t>“</a:t>
+            </a:r>
+            <a:r>
+              <a:rPr lang="en-US" dirty="0" err="1"/>
+              <a:t>Wabisabi</a:t>
+            </a:r>
+            <a:r>
+              <a:rPr lang="en-US" dirty="0"/>
+              <a:t>” (</a:t>
+            </a:r>
+            <a:r>
+              <a:rPr lang="ja-JP" altLang="en-US" dirty="0"/>
+              <a:t>侘び寂び</a:t>
+            </a:r>
+            <a:r>
+              <a:rPr lang="en-US" dirty="0"/>
+              <a:t> – literally “forlorn rusticism”): austere naturalistic beauty</a:t>
+            </a:r>
+          </a:p>
+          <a:p>
+            <a:r>
+              <a:rPr lang="en-US" dirty="0"/>
+              <a:t>Top-right to bottom-left traditional reading</a:t>
+            </a:r>
+          </a:p>
+          <a:p>
+            <a:endParaRPr lang="en-US" dirty="0"/>
+          </a:p>
+          <a:p>
+            <a:endParaRPr lang="en-US" dirty="0"/>
+          </a:p>
+        </p:txBody>
+      </p:sp>
+      <p:sp>
+        <p:nvSpPr>
+          <p:cNvPr id="5" name="Content Placeholder 2">
+            <a:extLst>
+              <a:ext uri="{FF2B5EF4-FFF2-40B4-BE49-F238E27FC236}">
+                <a16:creationId xmlns:a16="http://schemas.microsoft.com/office/drawing/2014/main" id="{23FC98BA-4B9A-F5AB-188B-57B429CF9F30}"/>
+              </a:ext>
+            </a:extLst>
+          </p:cNvPr>
+          <p:cNvSpPr txBox="1">
+            <a:spLocks/>
+          </p:cNvSpPr>
+          <p:nvPr/>
+        </p:nvSpPr>
+        <p:spPr>
+          <a:xfrm>
+            <a:off x="884332" y="5467529"/>
+            <a:ext cx="4206808" cy="1151965"/>
+          </a:xfrm>
+          <a:prstGeom prst="rect">
+            <a:avLst/>
+          </a:prstGeom>
+          <a:ln>
+            <a:solidFill>
+              <a:schemeClr val="accent2"/>
+            </a:solidFill>
+          </a:ln>
+        </p:spPr>
+        <p:txBody>
+          <a:bodyPr vert="horz" lIns="91440" tIns="45720" rIns="91440" bIns="45720" rtlCol="0" anchor="ctr">
+            <a:normAutofit/>
+          </a:bodyPr>
+          <a:lstStyle>
+            <a:lvl1pPr marL="342900" indent="-342900" algn="l" defTabSz="457200" rtl="0" eaLnBrk="1" latinLnBrk="0" hangingPunct="1">
+              <a:spcBef>
+                <a:spcPts val="1000"/>
+              </a:spcBef>
+              <a:spcAft>
+                <a:spcPts val="0"/>
+              </a:spcAft>
+              <a:buClr>
+                <a:schemeClr val="accent1"/>
+              </a:buClr>
+              <a:buSzPct val="80000"/>
+              <a:buFont typeface="Wingdings 3" charset="2"/>
+              <a:buChar char=""/>
+              <a:defRPr sz="1800" kern="1200">
+                <a:solidFill>
+                  <a:schemeClr val="tx1">
+                    <a:lumMod val="75000"/>
+                    <a:lumOff val="25000"/>
+                  </a:schemeClr>
+                </a:solidFill>
+                <a:latin typeface="+mn-lt"/>
+                <a:ea typeface="+mn-ea"/>
+                <a:cs typeface="+mn-cs"/>
+              </a:defRPr>
+            </a:lvl1pPr>
+            <a:lvl2pPr marL="742950" indent="-285750" algn="l" defTabSz="457200" rtl="0" eaLnBrk="1" latinLnBrk="0" hangingPunct="1">
+              <a:spcBef>
+                <a:spcPts val="1000"/>
+              </a:spcBef>
+              <a:spcAft>
+                <a:spcPts val="0"/>
+              </a:spcAft>
+              <a:buClr>
+                <a:schemeClr val="accent1"/>
+              </a:buClr>
+              <a:buSzPct val="80000"/>
+              <a:buFont typeface="Wingdings 3" charset="2"/>
+              <a:buChar char=""/>
+              <a:defRPr sz="1600" kern="1200">
+                <a:solidFill>
+                  <a:schemeClr val="tx1">
+                    <a:lumMod val="75000"/>
+                    <a:lumOff val="25000"/>
+                  </a:schemeClr>
+                </a:solidFill>
+                <a:latin typeface="+mn-lt"/>
+                <a:ea typeface="+mn-ea"/>
+                <a:cs typeface="+mn-cs"/>
+              </a:defRPr>
+            </a:lvl2pPr>
+            <a:lvl3pPr marL="1143000" indent="-228600" algn="l" defTabSz="457200" rtl="0" eaLnBrk="1" latinLnBrk="0" hangingPunct="1">
+              <a:spcBef>
+                <a:spcPts val="1000"/>
+              </a:spcBef>
+              <a:spcAft>
+                <a:spcPts val="0"/>
+              </a:spcAft>
+              <a:buClr>
+                <a:schemeClr val="accent1"/>
+              </a:buClr>
+              <a:buSzPct val="80000"/>
+              <a:buFont typeface="Wingdings 3" charset="2"/>
+              <a:buChar char=""/>
+              <a:defRPr sz="1400" kern="1200">
+                <a:solidFill>
+                  <a:schemeClr val="tx1">
+                    <a:lumMod val="75000"/>
+                    <a:lumOff val="25000"/>
+                  </a:schemeClr>
+                </a:solidFill>
+                <a:latin typeface="+mn-lt"/>
+                <a:ea typeface="+mn-ea"/>
+                <a:cs typeface="+mn-cs"/>
+              </a:defRPr>
+            </a:lvl3pPr>
+            <a:lvl4pPr marL="1600200" indent="-228600" algn="l" defTabSz="457200" rtl="0" eaLnBrk="1" latinLnBrk="0" hangingPunct="1">
+              <a:spcBef>
+                <a:spcPts val="1000"/>
+              </a:spcBef>
+              <a:spcAft>
+                <a:spcPts val="0"/>
+              </a:spcAft>
+              <a:buClr>
+                <a:schemeClr val="accent1"/>
+              </a:buClr>
+              <a:buSzPct val="80000"/>
+              <a:buFont typeface="Wingdings 3" charset="2"/>
+              <a:buChar char=""/>
+              <a:defRPr sz="1200" kern="1200">
+                <a:solidFill>
+                  <a:schemeClr val="tx1">
+                    <a:lumMod val="75000"/>
+                    <a:lumOff val="25000"/>
+                  </a:schemeClr>
+                </a:solidFill>
+                <a:latin typeface="+mn-lt"/>
+                <a:ea typeface="+mn-ea"/>
+                <a:cs typeface="+mn-cs"/>
+              </a:defRPr>
+            </a:lvl4pPr>
+            <a:lvl5pPr marL="2057400" indent="-228600" algn="l" defTabSz="457200" rtl="0" eaLnBrk="1" latinLnBrk="0" hangingPunct="1">
+              <a:spcBef>
+                <a:spcPts val="1000"/>
+              </a:spcBef>
+              <a:spcAft>
+                <a:spcPts val="0"/>
+              </a:spcAft>
+              <a:buClr>
+                <a:schemeClr val="accent1"/>
+              </a:buClr>
+              <a:buSzPct val="80000"/>
+              <a:buFont typeface="Wingdings 3" charset="2"/>
+              <a:buChar char=""/>
+              <a:defRPr sz="1200" kern="1200">
+                <a:solidFill>
+                  <a:schemeClr val="tx1">
+                    <a:lumMod val="75000"/>
+                    <a:lumOff val="25000"/>
+                  </a:schemeClr>
+                </a:solidFill>
+                <a:latin typeface="+mn-lt"/>
+                <a:ea typeface="+mn-ea"/>
+                <a:cs typeface="+mn-cs"/>
+              </a:defRPr>
+            </a:lvl5pPr>
+            <a:lvl6pPr marL="2514600" indent="-228600" algn="l" defTabSz="457200" rtl="0" eaLnBrk="1" latinLnBrk="0" hangingPunct="1">
+              <a:spcBef>
+                <a:spcPts val="1000"/>
+              </a:spcBef>
+              <a:spcAft>
+                <a:spcPts val="0"/>
+              </a:spcAft>
+              <a:buClr>
+                <a:schemeClr val="accent1"/>
+              </a:buClr>
+              <a:buSzPct val="80000"/>
+              <a:buFont typeface="Wingdings 3" charset="2"/>
+              <a:buChar char=""/>
+              <a:defRPr sz="1200" kern="1200">
+                <a:solidFill>
+                  <a:schemeClr val="tx1">
+                    <a:lumMod val="75000"/>
+                    <a:lumOff val="25000"/>
+                  </a:schemeClr>
+                </a:solidFill>
+                <a:latin typeface="+mn-lt"/>
+                <a:ea typeface="+mn-ea"/>
+                <a:cs typeface="+mn-cs"/>
+              </a:defRPr>
+            </a:lvl6pPr>
+            <a:lvl7pPr marL="2971800" indent="-228600" algn="l" defTabSz="457200" rtl="0" eaLnBrk="1" latinLnBrk="0" hangingPunct="1">
+              <a:spcBef>
+                <a:spcPts val="1000"/>
+              </a:spcBef>
+              <a:spcAft>
+                <a:spcPts val="0"/>
+              </a:spcAft>
+              <a:buClr>
+                <a:schemeClr val="accent1"/>
+              </a:buClr>
+              <a:buSzPct val="80000"/>
+              <a:buFont typeface="Wingdings 3" charset="2"/>
+              <a:buChar char=""/>
+              <a:defRPr sz="1200" kern="1200">
+                <a:solidFill>
+                  <a:schemeClr val="tx1">
+                    <a:lumMod val="75000"/>
+                    <a:lumOff val="25000"/>
+                  </a:schemeClr>
+                </a:solidFill>
+                <a:latin typeface="+mn-lt"/>
+                <a:ea typeface="+mn-ea"/>
+                <a:cs typeface="+mn-cs"/>
+              </a:defRPr>
+            </a:lvl7pPr>
+            <a:lvl8pPr marL="3429000" indent="-228600" algn="l" defTabSz="457200" rtl="0" eaLnBrk="1" latinLnBrk="0" hangingPunct="1">
+              <a:spcBef>
+                <a:spcPts val="1000"/>
+              </a:spcBef>
+              <a:spcAft>
+                <a:spcPts val="0"/>
+              </a:spcAft>
+              <a:buClr>
+                <a:schemeClr val="accent1"/>
+              </a:buClr>
+              <a:buSzPct val="80000"/>
+              <a:buFont typeface="Wingdings 3" charset="2"/>
+              <a:buChar char=""/>
+              <a:defRPr sz="1200" kern="1200">
+                <a:solidFill>
+                  <a:schemeClr val="tx1">
+                    <a:lumMod val="75000"/>
+                    <a:lumOff val="25000"/>
+                  </a:schemeClr>
+                </a:solidFill>
+                <a:latin typeface="+mn-lt"/>
+                <a:ea typeface="+mn-ea"/>
+                <a:cs typeface="+mn-cs"/>
+              </a:defRPr>
+            </a:lvl8pPr>
+            <a:lvl9pPr marL="3886200" indent="-228600" algn="l" defTabSz="457200" rtl="0" eaLnBrk="1" latinLnBrk="0" hangingPunct="1">
+              <a:spcBef>
+                <a:spcPts val="1000"/>
+              </a:spcBef>
+              <a:spcAft>
+                <a:spcPts val="0"/>
+              </a:spcAft>
+              <a:buClr>
+                <a:schemeClr val="accent1"/>
+              </a:buClr>
+              <a:buSzPct val="80000"/>
+              <a:buFont typeface="Wingdings 3" charset="2"/>
+              <a:buChar char=""/>
+              <a:defRPr sz="1200" kern="1200">
+                <a:solidFill>
+                  <a:schemeClr val="tx1">
+                    <a:lumMod val="75000"/>
+                    <a:lumOff val="25000"/>
+                  </a:schemeClr>
+                </a:solidFill>
+                <a:latin typeface="+mn-lt"/>
+                <a:ea typeface="+mn-ea"/>
+                <a:cs typeface="+mn-cs"/>
+              </a:defRPr>
+            </a:lvl9pPr>
+          </a:lstStyle>
+          <a:p>
+            <a:pPr marL="400050" lvl="1" indent="0">
+              <a:buNone/>
+            </a:pPr>
+            <a:r>
+              <a:rPr lang="en-US" sz="1800" i="1" dirty="0">
+                <a:solidFill>
+                  <a:schemeClr val="accent2"/>
+                </a:solidFill>
+              </a:rPr>
+              <a:t>It is self-evident that nothing concerning art is self-evident.</a:t>
+            </a:r>
+          </a:p>
+          <a:p>
+            <a:pPr marL="0" indent="0" algn="r">
+              <a:buNone/>
+            </a:pPr>
+            <a:r>
+              <a:rPr lang="en-US" dirty="0">
+                <a:solidFill>
+                  <a:schemeClr val="accent2"/>
+                </a:solidFill>
+              </a:rPr>
+              <a:t>- Theodore Adorno (1969)</a:t>
+            </a:r>
+            <a:endParaRPr lang="en-GB" dirty="0">
+              <a:solidFill>
+                <a:schemeClr val="accent2"/>
+              </a:solidFill>
+            </a:endParaRPr>
+          </a:p>
+        </p:txBody>
+      </p:sp>
+      <p:pic>
+        <p:nvPicPr>
+          <p:cNvPr id="10" name="Picture 9">
+            <a:extLst>
+              <a:ext uri="{FF2B5EF4-FFF2-40B4-BE49-F238E27FC236}">
+                <a16:creationId xmlns:a16="http://schemas.microsoft.com/office/drawing/2014/main" id="{BE196C86-3601-0048-86C2-673D2B26FF58}"/>
+              </a:ext>
+            </a:extLst>
+          </p:cNvPr>
+          <p:cNvPicPr>
+            <a:picLocks noChangeAspect="1"/>
+          </p:cNvPicPr>
+          <p:nvPr/>
+        </p:nvPicPr>
+        <p:blipFill rotWithShape="1">
+          <a:blip r:embed="rId2"/>
+          <a:srcRect l="1307" t="15585" r="2614" b="10910"/>
+          <a:stretch/>
+        </p:blipFill>
+        <p:spPr>
+          <a:xfrm>
+            <a:off x="884332" y="2012522"/>
+            <a:ext cx="4206808" cy="3218384"/>
+          </a:xfrm>
+          <a:prstGeom prst="rect">
+            <a:avLst/>
+          </a:prstGeom>
+        </p:spPr>
+      </p:pic>
+    </p:spTree>
+    <p:extLst>
+      <p:ext uri="{BB962C8B-B14F-4D97-AF65-F5344CB8AC3E}">
+        <p14:creationId xmlns:p14="http://schemas.microsoft.com/office/powerpoint/2010/main" val="2628807676"/>
+      </p:ext>
+    </p:extLst>
+  </p:cSld>
+  <p:clrMapOvr>
+    <a:masterClrMapping/>
+  </p:clrMapOvr>
+</p:sld>
+</file>
+
+<file path=ppt/slides/slide14.xml><?xml version="1.0" encoding="utf-8"?>
+<p:sld xmlns:a="http://schemas.openxmlformats.org/drawingml/2006/main" xmlns:r="http://schemas.openxmlformats.org/officeDocument/2006/relationships" xmlns:p="http://schemas.openxmlformats.org/presentationml/2006/main">
+  <p:cSld>
+    <p:spTree>
+      <p:nvGrpSpPr>
+        <p:cNvPr id="1" name=""/>
+        <p:cNvGrpSpPr/>
+        <p:nvPr/>
+      </p:nvGrpSpPr>
+      <p:grpSpPr>
+        <a:xfrm>
+          <a:off x="0" y="0"/>
+          <a:ext cx="0" cy="0"/>
+          <a:chOff x="0" y="0"/>
+          <a:chExt cx="0" cy="0"/>
+        </a:xfrm>
+      </p:grpSpPr>
+      <p:sp>
+        <p:nvSpPr>
+          <p:cNvPr id="4" name="Parallelogram 3">
+            <a:extLst>
+              <a:ext uri="{FF2B5EF4-FFF2-40B4-BE49-F238E27FC236}">
+                <a16:creationId xmlns:a16="http://schemas.microsoft.com/office/drawing/2014/main" id="{B64F6F81-92AB-7C0F-84F7-FAA6E5FC3CF2}"/>
+              </a:ext>
+            </a:extLst>
+          </p:cNvPr>
+          <p:cNvSpPr/>
+          <p:nvPr/>
+        </p:nvSpPr>
+        <p:spPr>
+          <a:xfrm>
+            <a:off x="6833360" y="-18874"/>
+            <a:ext cx="5069541" cy="6876874"/>
+          </a:xfrm>
+          <a:prstGeom prst="parallelogram">
+            <a:avLst>
+              <a:gd name="adj" fmla="val 19695"/>
+            </a:avLst>
+          </a:prstGeom>
+          <a:solidFill>
+            <a:schemeClr val="bg1"/>
+          </a:solidFill>
+          <a:ln>
+            <a:solidFill>
+              <a:schemeClr val="bg1"/>
+            </a:solidFill>
+          </a:ln>
+        </p:spPr>
+        <p:style>
+          <a:lnRef idx="2">
+            <a:schemeClr val="accent1">
+              <a:shade val="15000"/>
+            </a:schemeClr>
+          </a:lnRef>
+          <a:fillRef idx="1">
+            <a:schemeClr val="accent1"/>
+          </a:fillRef>
+          <a:effectRef idx="0">
+            <a:schemeClr val="accent1"/>
+          </a:effectRef>
+          <a:fontRef idx="minor">
+            <a:schemeClr val="lt1"/>
+          </a:fontRef>
+        </p:style>
+        <p:txBody>
+          <a:bodyPr rtlCol="0" anchor="ctr"/>
+          <a:lstStyle/>
+          <a:p>
+            <a:pPr algn="ctr"/>
+            <a:endParaRPr lang="en-GB"/>
+          </a:p>
+        </p:txBody>
+      </p:sp>
+      <p:sp>
+        <p:nvSpPr>
+          <p:cNvPr id="2" name="Title 1">
+            <a:extLst>
+              <a:ext uri="{FF2B5EF4-FFF2-40B4-BE49-F238E27FC236}">
+                <a16:creationId xmlns:a16="http://schemas.microsoft.com/office/drawing/2014/main" id="{701973DA-B0F9-E1A4-AE56-F1BD7BF4C677}"/>
+              </a:ext>
+            </a:extLst>
+          </p:cNvPr>
+          <p:cNvSpPr>
+            <a:spLocks noGrp="1"/>
+          </p:cNvSpPr>
+          <p:nvPr>
+            <p:ph type="title"/>
+          </p:nvPr>
+        </p:nvSpPr>
+        <p:spPr>
+          <a:xfrm>
+            <a:off x="677334" y="609599"/>
+            <a:ext cx="10107206" cy="1151965"/>
+          </a:xfrm>
+        </p:spPr>
+        <p:txBody>
+          <a:bodyPr>
+            <a:normAutofit/>
+          </a:bodyPr>
+          <a:lstStyle/>
+          <a:p>
+            <a:r>
+              <a:rPr lang="en-US" dirty="0"/>
               <a:t>Drama &amp; Perspective</a:t>
             </a:r>
             <a:br>
@@ -10436,7 +11003,7 @@
 </p:sld>
 </file>
 
-<file path=ppt/slides/slide14.xml><?xml version="1.0" encoding="utf-8"?>
+<file path=ppt/slides/slide15.xml><?xml version="1.0" encoding="utf-8"?>
 <p:sld xmlns:a="http://schemas.openxmlformats.org/drawingml/2006/main" xmlns:r="http://schemas.openxmlformats.org/officeDocument/2006/relationships" xmlns:p="http://schemas.openxmlformats.org/presentationml/2006/main">
   <p:cSld>
     <p:spTree>
@@ -11166,7 +11733,7 @@
           <a:p>
             <a:r>
               <a:rPr lang="en-US" dirty="0"/>
-              <a:t>“Weak” branches</a:t>
+              <a:t>Weak / immature-looking branches</a:t>
             </a:r>
           </a:p>
           <a:p>
@@ -11824,554 +12391,6 @@
     <p:extLst>
       <p:ext uri="{BB962C8B-B14F-4D97-AF65-F5344CB8AC3E}">
         <p14:creationId xmlns:p14="http://schemas.microsoft.com/office/powerpoint/2010/main" val="4262373755"/>
-      </p:ext>
-    </p:extLst>
-  </p:cSld>
-  <p:clrMapOvr>
-    <a:masterClrMapping/>
-  </p:clrMapOvr>
-</p:sld>
-</file>
-
-<file path=ppt/slides/slide15.xml><?xml version="1.0" encoding="utf-8"?>
-<p:sld xmlns:a="http://schemas.openxmlformats.org/drawingml/2006/main" xmlns:r="http://schemas.openxmlformats.org/officeDocument/2006/relationships" xmlns:p="http://schemas.openxmlformats.org/presentationml/2006/main">
-  <p:cSld>
-    <p:spTree>
-      <p:nvGrpSpPr>
-        <p:cNvPr id="1" name=""/>
-        <p:cNvGrpSpPr/>
-        <p:nvPr/>
-      </p:nvGrpSpPr>
-      <p:grpSpPr>
-        <a:xfrm>
-          <a:off x="0" y="0"/>
-          <a:ext cx="0" cy="0"/>
-          <a:chOff x="0" y="0"/>
-          <a:chExt cx="0" cy="0"/>
-        </a:xfrm>
-      </p:grpSpPr>
-      <p:sp>
-        <p:nvSpPr>
-          <p:cNvPr id="4" name="Parallelogram 3">
-            <a:extLst>
-              <a:ext uri="{FF2B5EF4-FFF2-40B4-BE49-F238E27FC236}">
-                <a16:creationId xmlns:a16="http://schemas.microsoft.com/office/drawing/2014/main" id="{B64F6F81-92AB-7C0F-84F7-FAA6E5FC3CF2}"/>
-              </a:ext>
-            </a:extLst>
-          </p:cNvPr>
-          <p:cNvSpPr/>
-          <p:nvPr/>
-        </p:nvSpPr>
-        <p:spPr>
-          <a:xfrm>
-            <a:off x="6833360" y="-18874"/>
-            <a:ext cx="5069541" cy="6876874"/>
-          </a:xfrm>
-          <a:prstGeom prst="parallelogram">
-            <a:avLst>
-              <a:gd name="adj" fmla="val 19695"/>
-            </a:avLst>
-          </a:prstGeom>
-          <a:solidFill>
-            <a:schemeClr val="bg1"/>
-          </a:solidFill>
-          <a:ln>
-            <a:solidFill>
-              <a:schemeClr val="bg1"/>
-            </a:solidFill>
-          </a:ln>
-        </p:spPr>
-        <p:style>
-          <a:lnRef idx="2">
-            <a:schemeClr val="accent1">
-              <a:shade val="15000"/>
-            </a:schemeClr>
-          </a:lnRef>
-          <a:fillRef idx="1">
-            <a:schemeClr val="accent1"/>
-          </a:fillRef>
-          <a:effectRef idx="0">
-            <a:schemeClr val="accent1"/>
-          </a:effectRef>
-          <a:fontRef idx="minor">
-            <a:schemeClr val="lt1"/>
-          </a:fontRef>
-        </p:style>
-        <p:txBody>
-          <a:bodyPr rtlCol="0" anchor="ctr"/>
-          <a:lstStyle/>
-          <a:p>
-            <a:pPr algn="ctr"/>
-            <a:endParaRPr lang="en-GB"/>
-          </a:p>
-        </p:txBody>
-      </p:sp>
-      <p:sp>
-        <p:nvSpPr>
-          <p:cNvPr id="2" name="Title 1">
-            <a:extLst>
-              <a:ext uri="{FF2B5EF4-FFF2-40B4-BE49-F238E27FC236}">
-                <a16:creationId xmlns:a16="http://schemas.microsoft.com/office/drawing/2014/main" id="{701973DA-B0F9-E1A4-AE56-F1BD7BF4C677}"/>
-              </a:ext>
-            </a:extLst>
-          </p:cNvPr>
-          <p:cNvSpPr>
-            <a:spLocks noGrp="1"/>
-          </p:cNvSpPr>
-          <p:nvPr>
-            <p:ph type="title"/>
-          </p:nvPr>
-        </p:nvSpPr>
-        <p:spPr>
-          <a:xfrm>
-            <a:off x="677334" y="609599"/>
-            <a:ext cx="10107206" cy="1151965"/>
-          </a:xfrm>
-        </p:spPr>
-        <p:txBody>
-          <a:bodyPr>
-            <a:normAutofit/>
-          </a:bodyPr>
-          <a:lstStyle/>
-          <a:p>
-            <a:r>
-              <a:rPr lang="en-US" dirty="0"/>
-              <a:t>Wabi-Sabi</a:t>
-            </a:r>
-            <a:br>
-              <a:rPr lang="en-US" dirty="0"/>
-            </a:br>
-            <a:r>
-              <a:rPr lang="en-US" sz="2800" dirty="0"/>
-              <a:t>Japanophilia 101</a:t>
-            </a:r>
-            <a:endParaRPr lang="en-GB" sz="2800" dirty="0"/>
-          </a:p>
-        </p:txBody>
-      </p:sp>
-      <p:sp>
-        <p:nvSpPr>
-          <p:cNvPr id="3" name="Content Placeholder 2">
-            <a:extLst>
-              <a:ext uri="{FF2B5EF4-FFF2-40B4-BE49-F238E27FC236}">
-                <a16:creationId xmlns:a16="http://schemas.microsoft.com/office/drawing/2014/main" id="{F7340934-5684-DA8A-A2B6-BA82211E4513}"/>
-              </a:ext>
-            </a:extLst>
-          </p:cNvPr>
-          <p:cNvSpPr>
-            <a:spLocks noGrp="1"/>
-          </p:cNvSpPr>
-          <p:nvPr>
-            <p:ph idx="1"/>
-          </p:nvPr>
-        </p:nvSpPr>
-        <p:spPr>
-          <a:xfrm>
-            <a:off x="5607423" y="1896034"/>
-            <a:ext cx="5634317" cy="4961965"/>
-          </a:xfrm>
-        </p:spPr>
-        <p:txBody>
-          <a:bodyPr>
-            <a:normAutofit/>
-          </a:bodyPr>
-          <a:lstStyle/>
-          <a:p>
-            <a:r>
-              <a:rPr lang="en-US" dirty="0"/>
-              <a:t>Obvious tool marks</a:t>
-            </a:r>
-          </a:p>
-          <a:p>
-            <a:pPr lvl="1"/>
-            <a:r>
-              <a:rPr lang="en-US" dirty="0"/>
-              <a:t>…Including wire scarring</a:t>
-            </a:r>
-          </a:p>
-          <a:p>
-            <a:r>
-              <a:rPr lang="en-US" dirty="0"/>
-              <a:t>xxx</a:t>
-            </a:r>
-          </a:p>
-          <a:p>
-            <a:endParaRPr lang="en-US" dirty="0"/>
-          </a:p>
-        </p:txBody>
-      </p:sp>
-      <p:sp>
-        <p:nvSpPr>
-          <p:cNvPr id="6" name="Content Placeholder 2">
-            <a:extLst>
-              <a:ext uri="{FF2B5EF4-FFF2-40B4-BE49-F238E27FC236}">
-                <a16:creationId xmlns:a16="http://schemas.microsoft.com/office/drawing/2014/main" id="{1D0AFEB3-8E62-C899-A368-55C2FEA2AF98}"/>
-              </a:ext>
-            </a:extLst>
-          </p:cNvPr>
-          <p:cNvSpPr txBox="1">
-            <a:spLocks/>
-          </p:cNvSpPr>
-          <p:nvPr/>
-        </p:nvSpPr>
-        <p:spPr>
-          <a:xfrm>
-            <a:off x="677334" y="4377016"/>
-            <a:ext cx="5069541" cy="2480983"/>
-          </a:xfrm>
-          <a:prstGeom prst="rect">
-            <a:avLst/>
-          </a:prstGeom>
-        </p:spPr>
-        <p:txBody>
-          <a:bodyPr vert="horz" lIns="91440" tIns="45720" rIns="91440" bIns="45720" rtlCol="0">
-            <a:normAutofit/>
-          </a:bodyPr>
-          <a:lstStyle>
-            <a:lvl1pPr marL="342900" indent="-342900" algn="l" defTabSz="457200" rtl="0" eaLnBrk="1" latinLnBrk="0" hangingPunct="1">
-              <a:spcBef>
-                <a:spcPts val="1000"/>
-              </a:spcBef>
-              <a:spcAft>
-                <a:spcPts val="0"/>
-              </a:spcAft>
-              <a:buClr>
-                <a:schemeClr val="accent1"/>
-              </a:buClr>
-              <a:buSzPct val="80000"/>
-              <a:buFont typeface="Wingdings 3" charset="2"/>
-              <a:buChar char=""/>
-              <a:defRPr sz="1800" kern="1200">
-                <a:solidFill>
-                  <a:schemeClr val="tx1">
-                    <a:lumMod val="75000"/>
-                    <a:lumOff val="25000"/>
-                  </a:schemeClr>
-                </a:solidFill>
-                <a:latin typeface="+mn-lt"/>
-                <a:ea typeface="+mn-ea"/>
-                <a:cs typeface="+mn-cs"/>
-              </a:defRPr>
-            </a:lvl1pPr>
-            <a:lvl2pPr marL="742950" indent="-285750" algn="l" defTabSz="457200" rtl="0" eaLnBrk="1" latinLnBrk="0" hangingPunct="1">
-              <a:spcBef>
-                <a:spcPts val="1000"/>
-              </a:spcBef>
-              <a:spcAft>
-                <a:spcPts val="0"/>
-              </a:spcAft>
-              <a:buClr>
-                <a:schemeClr val="accent1"/>
-              </a:buClr>
-              <a:buSzPct val="80000"/>
-              <a:buFont typeface="Wingdings 3" charset="2"/>
-              <a:buChar char=""/>
-              <a:defRPr sz="1600" kern="1200">
-                <a:solidFill>
-                  <a:schemeClr val="tx1">
-                    <a:lumMod val="75000"/>
-                    <a:lumOff val="25000"/>
-                  </a:schemeClr>
-                </a:solidFill>
-                <a:latin typeface="+mn-lt"/>
-                <a:ea typeface="+mn-ea"/>
-                <a:cs typeface="+mn-cs"/>
-              </a:defRPr>
-            </a:lvl2pPr>
-            <a:lvl3pPr marL="1143000" indent="-228600" algn="l" defTabSz="457200" rtl="0" eaLnBrk="1" latinLnBrk="0" hangingPunct="1">
-              <a:spcBef>
-                <a:spcPts val="1000"/>
-              </a:spcBef>
-              <a:spcAft>
-                <a:spcPts val="0"/>
-              </a:spcAft>
-              <a:buClr>
-                <a:schemeClr val="accent1"/>
-              </a:buClr>
-              <a:buSzPct val="80000"/>
-              <a:buFont typeface="Wingdings 3" charset="2"/>
-              <a:buChar char=""/>
-              <a:defRPr sz="1400" kern="1200">
-                <a:solidFill>
-                  <a:schemeClr val="tx1">
-                    <a:lumMod val="75000"/>
-                    <a:lumOff val="25000"/>
-                  </a:schemeClr>
-                </a:solidFill>
-                <a:latin typeface="+mn-lt"/>
-                <a:ea typeface="+mn-ea"/>
-                <a:cs typeface="+mn-cs"/>
-              </a:defRPr>
-            </a:lvl3pPr>
-            <a:lvl4pPr marL="1600200" indent="-228600" algn="l" defTabSz="457200" rtl="0" eaLnBrk="1" latinLnBrk="0" hangingPunct="1">
-              <a:spcBef>
-                <a:spcPts val="1000"/>
-              </a:spcBef>
-              <a:spcAft>
-                <a:spcPts val="0"/>
-              </a:spcAft>
-              <a:buClr>
-                <a:schemeClr val="accent1"/>
-              </a:buClr>
-              <a:buSzPct val="80000"/>
-              <a:buFont typeface="Wingdings 3" charset="2"/>
-              <a:buChar char=""/>
-              <a:defRPr sz="1200" kern="1200">
-                <a:solidFill>
-                  <a:schemeClr val="tx1">
-                    <a:lumMod val="75000"/>
-                    <a:lumOff val="25000"/>
-                  </a:schemeClr>
-                </a:solidFill>
-                <a:latin typeface="+mn-lt"/>
-                <a:ea typeface="+mn-ea"/>
-                <a:cs typeface="+mn-cs"/>
-              </a:defRPr>
-            </a:lvl4pPr>
-            <a:lvl5pPr marL="2057400" indent="-228600" algn="l" defTabSz="457200" rtl="0" eaLnBrk="1" latinLnBrk="0" hangingPunct="1">
-              <a:spcBef>
-                <a:spcPts val="1000"/>
-              </a:spcBef>
-              <a:spcAft>
-                <a:spcPts val="0"/>
-              </a:spcAft>
-              <a:buClr>
-                <a:schemeClr val="accent1"/>
-              </a:buClr>
-              <a:buSzPct val="80000"/>
-              <a:buFont typeface="Wingdings 3" charset="2"/>
-              <a:buChar char=""/>
-              <a:defRPr sz="1200" kern="1200">
-                <a:solidFill>
-                  <a:schemeClr val="tx1">
-                    <a:lumMod val="75000"/>
-                    <a:lumOff val="25000"/>
-                  </a:schemeClr>
-                </a:solidFill>
-                <a:latin typeface="+mn-lt"/>
-                <a:ea typeface="+mn-ea"/>
-                <a:cs typeface="+mn-cs"/>
-              </a:defRPr>
-            </a:lvl5pPr>
-            <a:lvl6pPr marL="2514600" indent="-228600" algn="l" defTabSz="457200" rtl="0" eaLnBrk="1" latinLnBrk="0" hangingPunct="1">
-              <a:spcBef>
-                <a:spcPts val="1000"/>
-              </a:spcBef>
-              <a:spcAft>
-                <a:spcPts val="0"/>
-              </a:spcAft>
-              <a:buClr>
-                <a:schemeClr val="accent1"/>
-              </a:buClr>
-              <a:buSzPct val="80000"/>
-              <a:buFont typeface="Wingdings 3" charset="2"/>
-              <a:buChar char=""/>
-              <a:defRPr sz="1200" kern="1200">
-                <a:solidFill>
-                  <a:schemeClr val="tx1">
-                    <a:lumMod val="75000"/>
-                    <a:lumOff val="25000"/>
-                  </a:schemeClr>
-                </a:solidFill>
-                <a:latin typeface="+mn-lt"/>
-                <a:ea typeface="+mn-ea"/>
-                <a:cs typeface="+mn-cs"/>
-              </a:defRPr>
-            </a:lvl6pPr>
-            <a:lvl7pPr marL="2971800" indent="-228600" algn="l" defTabSz="457200" rtl="0" eaLnBrk="1" latinLnBrk="0" hangingPunct="1">
-              <a:spcBef>
-                <a:spcPts val="1000"/>
-              </a:spcBef>
-              <a:spcAft>
-                <a:spcPts val="0"/>
-              </a:spcAft>
-              <a:buClr>
-                <a:schemeClr val="accent1"/>
-              </a:buClr>
-              <a:buSzPct val="80000"/>
-              <a:buFont typeface="Wingdings 3" charset="2"/>
-              <a:buChar char=""/>
-              <a:defRPr sz="1200" kern="1200">
-                <a:solidFill>
-                  <a:schemeClr val="tx1">
-                    <a:lumMod val="75000"/>
-                    <a:lumOff val="25000"/>
-                  </a:schemeClr>
-                </a:solidFill>
-                <a:latin typeface="+mn-lt"/>
-                <a:ea typeface="+mn-ea"/>
-                <a:cs typeface="+mn-cs"/>
-              </a:defRPr>
-            </a:lvl7pPr>
-            <a:lvl8pPr marL="3429000" indent="-228600" algn="l" defTabSz="457200" rtl="0" eaLnBrk="1" latinLnBrk="0" hangingPunct="1">
-              <a:spcBef>
-                <a:spcPts val="1000"/>
-              </a:spcBef>
-              <a:spcAft>
-                <a:spcPts val="0"/>
-              </a:spcAft>
-              <a:buClr>
-                <a:schemeClr val="accent1"/>
-              </a:buClr>
-              <a:buSzPct val="80000"/>
-              <a:buFont typeface="Wingdings 3" charset="2"/>
-              <a:buChar char=""/>
-              <a:defRPr sz="1200" kern="1200">
-                <a:solidFill>
-                  <a:schemeClr val="tx1">
-                    <a:lumMod val="75000"/>
-                    <a:lumOff val="25000"/>
-                  </a:schemeClr>
-                </a:solidFill>
-                <a:latin typeface="+mn-lt"/>
-                <a:ea typeface="+mn-ea"/>
-                <a:cs typeface="+mn-cs"/>
-              </a:defRPr>
-            </a:lvl8pPr>
-            <a:lvl9pPr marL="3886200" indent="-228600" algn="l" defTabSz="457200" rtl="0" eaLnBrk="1" latinLnBrk="0" hangingPunct="1">
-              <a:spcBef>
-                <a:spcPts val="1000"/>
-              </a:spcBef>
-              <a:spcAft>
-                <a:spcPts val="0"/>
-              </a:spcAft>
-              <a:buClr>
-                <a:schemeClr val="accent1"/>
-              </a:buClr>
-              <a:buSzPct val="80000"/>
-              <a:buFont typeface="Wingdings 3" charset="2"/>
-              <a:buChar char=""/>
-              <a:defRPr sz="1200" kern="1200">
-                <a:solidFill>
-                  <a:schemeClr val="tx1">
-                    <a:lumMod val="75000"/>
-                    <a:lumOff val="25000"/>
-                  </a:schemeClr>
-                </a:solidFill>
-                <a:latin typeface="+mn-lt"/>
-                <a:ea typeface="+mn-ea"/>
-                <a:cs typeface="+mn-cs"/>
-              </a:defRPr>
-            </a:lvl9pPr>
-          </a:lstStyle>
-          <a:p>
-            <a:r>
-              <a:rPr lang="en-US" dirty="0"/>
-              <a:t>“Wabi” () – literally “forlorn”</a:t>
-            </a:r>
-          </a:p>
-          <a:p>
-            <a:r>
-              <a:rPr lang="en-US" dirty="0"/>
-              <a:t>“Sabi” () – literally “rustic”</a:t>
-            </a:r>
-          </a:p>
-        </p:txBody>
-      </p:sp>
-      <p:sp>
-        <p:nvSpPr>
-          <p:cNvPr id="7" name="Rectangle 6">
-            <a:extLst>
-              <a:ext uri="{FF2B5EF4-FFF2-40B4-BE49-F238E27FC236}">
-                <a16:creationId xmlns:a16="http://schemas.microsoft.com/office/drawing/2014/main" id="{D1471E41-7663-9037-5260-15F24A9C295E}"/>
-              </a:ext>
-            </a:extLst>
-          </p:cNvPr>
-          <p:cNvSpPr/>
-          <p:nvPr/>
-        </p:nvSpPr>
-        <p:spPr>
-          <a:xfrm>
-            <a:off x="677333" y="1896034"/>
-            <a:ext cx="4620807" cy="2245660"/>
-          </a:xfrm>
-          <a:prstGeom prst="rect">
-            <a:avLst/>
-          </a:prstGeom>
-        </p:spPr>
-        <p:style>
-          <a:lnRef idx="2">
-            <a:schemeClr val="accent1">
-              <a:shade val="15000"/>
-            </a:schemeClr>
-          </a:lnRef>
-          <a:fillRef idx="1">
-            <a:schemeClr val="accent1"/>
-          </a:fillRef>
-          <a:effectRef idx="0">
-            <a:schemeClr val="accent1"/>
-          </a:effectRef>
-          <a:fontRef idx="minor">
-            <a:schemeClr val="lt1"/>
-          </a:fontRef>
-        </p:style>
-        <p:txBody>
-          <a:bodyPr rtlCol="0" anchor="ctr"/>
-          <a:lstStyle/>
-          <a:p>
-            <a:pPr algn="ctr"/>
-            <a:r>
-              <a:rPr lang="en-US" dirty="0"/>
-              <a:t>Image</a:t>
-            </a:r>
-            <a:endParaRPr lang="en-GB" dirty="0"/>
-          </a:p>
-        </p:txBody>
-      </p:sp>
-      <p:sp>
-        <p:nvSpPr>
-          <p:cNvPr id="8" name="Rectangle 7">
-            <a:extLst>
-              <a:ext uri="{FF2B5EF4-FFF2-40B4-BE49-F238E27FC236}">
-                <a16:creationId xmlns:a16="http://schemas.microsoft.com/office/drawing/2014/main" id="{F61D0B2B-246B-0419-E389-DA8B691598FB}"/>
-              </a:ext>
-            </a:extLst>
-          </p:cNvPr>
-          <p:cNvSpPr/>
-          <p:nvPr/>
-        </p:nvSpPr>
-        <p:spPr>
-          <a:xfrm>
-            <a:off x="7070912" y="358641"/>
-            <a:ext cx="3966882" cy="582653"/>
-          </a:xfrm>
-          <a:prstGeom prst="rect">
-            <a:avLst/>
-          </a:prstGeom>
-        </p:spPr>
-        <p:style>
-          <a:lnRef idx="2">
-            <a:schemeClr val="accent3">
-              <a:shade val="15000"/>
-            </a:schemeClr>
-          </a:lnRef>
-          <a:fillRef idx="1">
-            <a:schemeClr val="accent3"/>
-          </a:fillRef>
-          <a:effectRef idx="0">
-            <a:schemeClr val="accent3"/>
-          </a:effectRef>
-          <a:fontRef idx="minor">
-            <a:schemeClr val="lt1"/>
-          </a:fontRef>
-        </p:style>
-        <p:txBody>
-          <a:bodyPr rtlCol="0" anchor="ctr"/>
-          <a:lstStyle/>
-          <a:p>
-            <a:pPr algn="ctr"/>
-            <a:r>
-              <a:rPr lang="en-US" dirty="0"/>
-              <a:t>Finish slide</a:t>
-            </a:r>
-            <a:endParaRPr lang="en-GB" dirty="0"/>
-          </a:p>
-        </p:txBody>
-      </p:sp>
-    </p:spTree>
-    <p:extLst>
-      <p:ext uri="{BB962C8B-B14F-4D97-AF65-F5344CB8AC3E}">
-        <p14:creationId xmlns:p14="http://schemas.microsoft.com/office/powerpoint/2010/main" val="2628807676"/>
       </p:ext>
     </p:extLst>
   </p:cSld>

</xml_diff>

<commit_message>
Art slide: minor fixes
</commit_message>
<xml_diff>
--- a/Courseware/Bonsai On A Budget (running).pptx
+++ b/Courseware/Bonsai On A Budget (running).pptx
@@ -9962,19 +9962,31 @@
             </a:pPr>
             <a:r>
               <a:rPr lang="en-US" dirty="0"/>
-              <a:t>General aesthetic principles:</a:t>
+              <a:t>Key elements of visual design:</a:t>
             </a:r>
           </a:p>
           <a:p>
             <a:r>
               <a:rPr lang="en-US" dirty="0"/>
-              <a:t>Harmony: similarity vs variety</a:t>
+              <a:t>Movement &amp; rhythm</a:t>
             </a:r>
           </a:p>
           <a:p>
             <a:r>
               <a:rPr lang="en-US" dirty="0"/>
-              <a:t>Perspective</a:t>
+              <a:t>Balance: symmetry vs asymmetry</a:t>
+            </a:r>
+          </a:p>
+          <a:p>
+            <a:r>
+              <a:rPr lang="en-US" dirty="0"/>
+              <a:t>Similarity &amp; harmony vs contrast &amp; variety</a:t>
+            </a:r>
+          </a:p>
+          <a:p>
+            <a:r>
+              <a:rPr lang="en-US" dirty="0"/>
+              <a:t>Perspective &amp; proportion</a:t>
             </a:r>
           </a:p>
           <a:p>
@@ -9986,13 +9998,7 @@
           <a:p>
             <a:r>
               <a:rPr lang="en-US" dirty="0"/>
-              <a:t>Balance: symmetry vs asymmetry</a:t>
-            </a:r>
-          </a:p>
-          <a:p>
-            <a:r>
-              <a:rPr lang="en-US" dirty="0"/>
-              <a:t>Rhythm</a:t>
+              <a:t>Unity: wow factor</a:t>
             </a:r>
           </a:p>
           <a:p>
@@ -10367,6 +10373,56 @@
           </a:prstGeom>
         </p:spPr>
       </p:pic>
+      <p:sp>
+        <p:nvSpPr>
+          <p:cNvPr id="6" name="Rectangle 5">
+            <a:extLst>
+              <a:ext uri="{FF2B5EF4-FFF2-40B4-BE49-F238E27FC236}">
+                <a16:creationId xmlns:a16="http://schemas.microsoft.com/office/drawing/2014/main" id="{3188895D-BD49-78A3-101B-EA9976103472}"/>
+              </a:ext>
+            </a:extLst>
+          </p:cNvPr>
+          <p:cNvSpPr/>
+          <p:nvPr/>
+        </p:nvSpPr>
+        <p:spPr>
+          <a:xfrm>
+            <a:off x="7070912" y="372088"/>
+            <a:ext cx="3966882" cy="582653"/>
+          </a:xfrm>
+          <a:prstGeom prst="rect">
+            <a:avLst/>
+          </a:prstGeom>
+        </p:spPr>
+        <p:style>
+          <a:lnRef idx="2">
+            <a:schemeClr val="accent1">
+              <a:shade val="15000"/>
+            </a:schemeClr>
+          </a:lnRef>
+          <a:fillRef idx="1">
+            <a:schemeClr val="accent1"/>
+          </a:fillRef>
+          <a:effectRef idx="0">
+            <a:schemeClr val="accent1"/>
+          </a:effectRef>
+          <a:fontRef idx="minor">
+            <a:schemeClr val="lt1"/>
+          </a:fontRef>
+        </p:style>
+        <p:txBody>
+          <a:bodyPr rtlCol="0" anchor="ctr"/>
+          <a:lstStyle/>
+          <a:p>
+            <a:pPr algn="ctr"/>
+            <a:r>
+              <a:rPr lang="en-US" dirty="0"/>
+              <a:t>Good enough</a:t>
+            </a:r>
+            <a:endParaRPr lang="en-GB" dirty="0"/>
+          </a:p>
+        </p:txBody>
+      </p:sp>
     </p:spTree>
     <p:extLst>
       <p:ext uri="{BB962C8B-B14F-4D97-AF65-F5344CB8AC3E}">

</xml_diff>

<commit_message>
Finalised "why prune" slide
</commit_message>
<xml_diff>
--- a/Courseware/Bonsai On A Budget (running).pptx
+++ b/Courseware/Bonsai On A Budget (running).pptx
@@ -19788,7 +19788,9 @@
           </a:xfrm>
         </p:spPr>
         <p:txBody>
-          <a:bodyPr/>
+          <a:bodyPr>
+            <a:normAutofit/>
+          </a:bodyPr>
           <a:lstStyle/>
           <a:p>
             <a:r>
@@ -19817,12 +19819,27 @@
             </a:r>
           </a:p>
           <a:p>
+            <a:pPr lvl="1"/>
             <a:r>
               <a:rPr lang="en-GB" dirty="0"/>
-              <a:t>Pick winners (before the tree can pick for us!) - improve spacing and remove congestion</a:t>
-            </a:r>
-          </a:p>
-          <a:p>
+              <a:t>Continuing the ramification past the eye’s limits creates the illusion of infinite depth</a:t>
+            </a:r>
+          </a:p>
+          <a:p>
+            <a:r>
+              <a:rPr lang="en-GB" dirty="0"/>
+              <a:t>Pick winners - before the tree can pick for us!</a:t>
+            </a:r>
+          </a:p>
+          <a:p>
+            <a:pPr lvl="1"/>
+            <a:r>
+              <a:rPr lang="en-GB" dirty="0"/>
+              <a:t>Improve spacing and remove congestion and “fluff”</a:t>
+            </a:r>
+          </a:p>
+          <a:p>
+            <a:pPr lvl="1"/>
             <a:r>
               <a:rPr lang="en-GB" dirty="0"/>
               <a:t>“Balance energy” to fight apical dominance and force growth in more interesting areas</a:t>
@@ -19846,22 +19863,16 @@
             <a:r>
               <a:rPr lang="en-GB" dirty="0"/>
               <a:t>Reduce water shock when re-potting</a:t>
-            </a:r>
-          </a:p>
-          <a:p>
-            <a:r>
-              <a:rPr lang="en-GB" dirty="0"/>
-              <a:t>Remove “fluff”</a:t>
             </a:r>
           </a:p>
         </p:txBody>
       </p:sp>
       <p:sp>
         <p:nvSpPr>
-          <p:cNvPr id="6" name="Rectangle 5">
+          <p:cNvPr id="5" name="Rectangle 4">
             <a:extLst>
               <a:ext uri="{FF2B5EF4-FFF2-40B4-BE49-F238E27FC236}">
-                <a16:creationId xmlns:a16="http://schemas.microsoft.com/office/drawing/2014/main" id="{73C3CDBD-AFA8-F7FD-914C-CC76F8D0E2A8}"/>
+                <a16:creationId xmlns:a16="http://schemas.microsoft.com/office/drawing/2014/main" id="{79417E18-8FBC-F29E-544E-05CC635A49BD}"/>
               </a:ext>
             </a:extLst>
           </p:cNvPr>
@@ -19879,15 +19890,15 @@
         </p:spPr>
         <p:style>
           <a:lnRef idx="2">
-            <a:schemeClr val="accent3">
+            <a:schemeClr val="accent1">
               <a:shade val="15000"/>
             </a:schemeClr>
           </a:lnRef>
           <a:fillRef idx="1">
-            <a:schemeClr val="accent3"/>
+            <a:schemeClr val="accent1"/>
           </a:fillRef>
           <a:effectRef idx="0">
-            <a:schemeClr val="accent3"/>
+            <a:schemeClr val="accent1"/>
           </a:effectRef>
           <a:fontRef idx="minor">
             <a:schemeClr val="lt1"/>
@@ -19900,7 +19911,7 @@
             <a:pPr algn="ctr"/>
             <a:r>
               <a:rPr lang="en-US" dirty="0"/>
-              <a:t>Can I reduce the number of bullets here?  Structural vs ram vs canopy</a:t>
+              <a:t>Good enough</a:t>
             </a:r>
             <a:endParaRPr lang="en-GB" dirty="0"/>
           </a:p>

</xml_diff>